<commit_message>
added pandas + pyData
</commit_message>
<xml_diff>
--- a/week_11/11.1 Introducing Pandas.pptx
+++ b/week_11/11.1 Introducing Pandas.pptx
@@ -7,6 +7,7 @@
   <p:sldIdLst>
     <p:sldId id="256" r:id="rId2"/>
     <p:sldId id="257" r:id="rId3"/>
+    <p:sldId id="258" r:id="rId4"/>
   </p:sldIdLst>
   <p:sldSz cx="9144000" cy="6858000" type="screen4x3"/>
   <p:notesSz cx="6858000" cy="9144000"/>
@@ -289,7 +290,7 @@
           <a:p>
             <a:fld id="{30A10C02-35BF-C647-A35C-91B453C8803C}" type="datetimeFigureOut">
               <a:rPr lang="en-US" smtClean="0"/>
-              <a:t>8/25/15</a:t>
+              <a:t>9/20/15</a:t>
             </a:fld>
             <a:endParaRPr lang="en-US"/>
           </a:p>
@@ -459,7 +460,7 @@
           <a:p>
             <a:fld id="{30A10C02-35BF-C647-A35C-91B453C8803C}" type="datetimeFigureOut">
               <a:rPr lang="en-US" smtClean="0"/>
-              <a:t>8/25/15</a:t>
+              <a:t>9/20/15</a:t>
             </a:fld>
             <a:endParaRPr lang="en-US"/>
           </a:p>
@@ -639,7 +640,7 @@
           <a:p>
             <a:fld id="{30A10C02-35BF-C647-A35C-91B453C8803C}" type="datetimeFigureOut">
               <a:rPr lang="en-US" smtClean="0"/>
-              <a:t>8/25/15</a:t>
+              <a:t>9/20/15</a:t>
             </a:fld>
             <a:endParaRPr lang="en-US"/>
           </a:p>
@@ -809,7 +810,7 @@
           <a:p>
             <a:fld id="{30A10C02-35BF-C647-A35C-91B453C8803C}" type="datetimeFigureOut">
               <a:rPr lang="en-US" smtClean="0"/>
-              <a:t>8/25/15</a:t>
+              <a:t>9/20/15</a:t>
             </a:fld>
             <a:endParaRPr lang="en-US"/>
           </a:p>
@@ -1055,7 +1056,7 @@
           <a:p>
             <a:fld id="{30A10C02-35BF-C647-A35C-91B453C8803C}" type="datetimeFigureOut">
               <a:rPr lang="en-US" smtClean="0"/>
-              <a:t>8/25/15</a:t>
+              <a:t>9/20/15</a:t>
             </a:fld>
             <a:endParaRPr lang="en-US"/>
           </a:p>
@@ -1343,7 +1344,7 @@
           <a:p>
             <a:fld id="{30A10C02-35BF-C647-A35C-91B453C8803C}" type="datetimeFigureOut">
               <a:rPr lang="en-US" smtClean="0"/>
-              <a:t>8/25/15</a:t>
+              <a:t>9/20/15</a:t>
             </a:fld>
             <a:endParaRPr lang="en-US"/>
           </a:p>
@@ -1765,7 +1766,7 @@
           <a:p>
             <a:fld id="{30A10C02-35BF-C647-A35C-91B453C8803C}" type="datetimeFigureOut">
               <a:rPr lang="en-US" smtClean="0"/>
-              <a:t>8/25/15</a:t>
+              <a:t>9/20/15</a:t>
             </a:fld>
             <a:endParaRPr lang="en-US"/>
           </a:p>
@@ -1883,7 +1884,7 @@
           <a:p>
             <a:fld id="{30A10C02-35BF-C647-A35C-91B453C8803C}" type="datetimeFigureOut">
               <a:rPr lang="en-US" smtClean="0"/>
-              <a:t>8/25/15</a:t>
+              <a:t>9/20/15</a:t>
             </a:fld>
             <a:endParaRPr lang="en-US"/>
           </a:p>
@@ -1978,7 +1979,7 @@
           <a:p>
             <a:fld id="{30A10C02-35BF-C647-A35C-91B453C8803C}" type="datetimeFigureOut">
               <a:rPr lang="en-US" smtClean="0"/>
-              <a:t>8/25/15</a:t>
+              <a:t>9/20/15</a:t>
             </a:fld>
             <a:endParaRPr lang="en-US"/>
           </a:p>
@@ -2255,7 +2256,7 @@
           <a:p>
             <a:fld id="{30A10C02-35BF-C647-A35C-91B453C8803C}" type="datetimeFigureOut">
               <a:rPr lang="en-US" smtClean="0"/>
-              <a:t>8/25/15</a:t>
+              <a:t>9/20/15</a:t>
             </a:fld>
             <a:endParaRPr lang="en-US"/>
           </a:p>
@@ -2508,7 +2509,7 @@
           <a:p>
             <a:fld id="{30A10C02-35BF-C647-A35C-91B453C8803C}" type="datetimeFigureOut">
               <a:rPr lang="en-US" smtClean="0"/>
-              <a:t>8/25/15</a:t>
+              <a:t>9/20/15</a:t>
             </a:fld>
             <a:endParaRPr lang="en-US"/>
           </a:p>
@@ -2721,7 +2722,7 @@
           <a:p>
             <a:fld id="{30A10C02-35BF-C647-A35C-91B453C8803C}" type="datetimeFigureOut">
               <a:rPr lang="en-US" smtClean="0"/>
-              <a:t>8/25/15</a:t>
+              <a:t>9/20/15</a:t>
             </a:fld>
             <a:endParaRPr lang="en-US"/>
           </a:p>
@@ -3185,7 +3186,7 @@
           <a:p>
             <a:r>
               <a:rPr lang="en-US" dirty="0" smtClean="0"/>
-              <a:t>Points to include</a:t>
+              <a:t>pandas</a:t>
             </a:r>
             <a:endParaRPr lang="en-US" dirty="0"/>
           </a:p>
@@ -3203,20 +3204,77 @@
         </p:nvSpPr>
         <p:spPr/>
         <p:txBody>
-          <a:bodyPr/>
+          <a:bodyPr>
+            <a:normAutofit lnSpcReduction="10000"/>
+          </a:bodyPr>
           <a:lstStyle/>
           <a:p>
             <a:r>
               <a:rPr lang="en-US" dirty="0" smtClean="0"/>
-              <a:t>Would like to bring </a:t>
-            </a:r>
+              <a:t>Your new best friend</a:t>
+            </a:r>
+          </a:p>
+          <a:p>
             <a:r>
               <a:rPr lang="en-US" dirty="0" smtClean="0"/>
-              <a:t>the points you started the Pandas Overview with and bring them in </a:t>
-            </a:r>
-            <a:r>
-              <a:rPr lang="en-US" smtClean="0"/>
-              <a:t>here.</a:t>
+              <a:t>Several Core Types</a:t>
+            </a:r>
+          </a:p>
+          <a:p>
+            <a:pPr lvl="1"/>
+            <a:r>
+              <a:rPr lang="en-US" dirty="0" smtClean="0"/>
+              <a:t>Index </a:t>
+            </a:r>
+          </a:p>
+          <a:p>
+            <a:pPr lvl="2"/>
+            <a:r>
+              <a:rPr lang="en-US" dirty="0" smtClean="0"/>
+              <a:t>how you access + label the data</a:t>
+            </a:r>
+          </a:p>
+          <a:p>
+            <a:pPr lvl="1"/>
+            <a:r>
+              <a:rPr lang="en-US" dirty="0" smtClean="0"/>
+              <a:t>Series</a:t>
+            </a:r>
+          </a:p>
+          <a:p>
+            <a:pPr lvl="2"/>
+            <a:r>
+              <a:rPr lang="en-US" dirty="0" smtClean="0"/>
+              <a:t>a single column of data</a:t>
+            </a:r>
+          </a:p>
+          <a:p>
+            <a:pPr lvl="2"/>
+            <a:r>
+              <a:rPr lang="en-US" dirty="0" smtClean="0"/>
+              <a:t>Has an Index</a:t>
+            </a:r>
+          </a:p>
+          <a:p>
+            <a:pPr lvl="1"/>
+            <a:r>
+              <a:rPr lang="en-US" dirty="0" err="1" smtClean="0"/>
+              <a:t>DataFrame</a:t>
+            </a:r>
+            <a:endParaRPr lang="en-US" dirty="0" smtClean="0"/>
+          </a:p>
+          <a:p>
+            <a:pPr lvl="2"/>
+            <a:r>
+              <a:rPr lang="en-US" dirty="0" smtClean="0"/>
+              <a:t>A combination of multiple series</a:t>
+            </a:r>
+          </a:p>
+          <a:p>
+            <a:pPr lvl="2"/>
+            <a:r>
+              <a:rPr lang="en-US" dirty="0" smtClean="0"/>
+              <a:t>Has an Index</a:t>
             </a:r>
             <a:endParaRPr lang="en-US" dirty="0" smtClean="0"/>
           </a:p>
@@ -3226,6 +3284,110 @@
     <p:extLst>
       <p:ext uri="{BB962C8B-B14F-4D97-AF65-F5344CB8AC3E}">
         <p14:creationId xmlns:p14="http://schemas.microsoft.com/office/powerpoint/2010/main" val="4011894005"/>
+      </p:ext>
+    </p:extLst>
+  </p:cSld>
+  <p:clrMapOvr>
+    <a:masterClrMapping/>
+  </p:clrMapOvr>
+</p:sld>
+</file>
+
+<file path=ppt/slides/slide3.xml><?xml version="1.0" encoding="utf-8"?>
+<p:sld xmlns:a="http://schemas.openxmlformats.org/drawingml/2006/main" xmlns:r="http://schemas.openxmlformats.org/officeDocument/2006/relationships" xmlns:p="http://schemas.openxmlformats.org/presentationml/2006/main">
+  <p:cSld>
+    <p:spTree>
+      <p:nvGrpSpPr>
+        <p:cNvPr id="1" name=""/>
+        <p:cNvGrpSpPr/>
+        <p:nvPr/>
+      </p:nvGrpSpPr>
+      <p:grpSpPr>
+        <a:xfrm>
+          <a:off x="0" y="0"/>
+          <a:ext cx="0" cy="0"/>
+          <a:chOff x="0" y="0"/>
+          <a:chExt cx="0" cy="0"/>
+        </a:xfrm>
+      </p:grpSpPr>
+      <p:sp>
+        <p:nvSpPr>
+          <p:cNvPr id="2" name="Title 1"/>
+          <p:cNvSpPr>
+            <a:spLocks noGrp="1"/>
+          </p:cNvSpPr>
+          <p:nvPr>
+            <p:ph type="title"/>
+          </p:nvPr>
+        </p:nvSpPr>
+        <p:spPr/>
+        <p:txBody>
+          <a:bodyPr/>
+          <a:lstStyle/>
+          <a:p>
+            <a:r>
+              <a:rPr lang="en-US" dirty="0" smtClean="0"/>
+              <a:t>The Key to pandas</a:t>
+            </a:r>
+            <a:endParaRPr lang="en-US" dirty="0"/>
+          </a:p>
+        </p:txBody>
+      </p:sp>
+      <p:sp>
+        <p:nvSpPr>
+          <p:cNvPr id="3" name="Content Placeholder 2"/>
+          <p:cNvSpPr>
+            <a:spLocks noGrp="1"/>
+          </p:cNvSpPr>
+          <p:nvPr>
+            <p:ph idx="1"/>
+          </p:nvPr>
+        </p:nvSpPr>
+        <p:spPr/>
+        <p:txBody>
+          <a:bodyPr/>
+          <a:lstStyle/>
+          <a:p>
+            <a:r>
+              <a:rPr lang="en-US" dirty="0" smtClean="0"/>
+              <a:t>Sits on top of </a:t>
+            </a:r>
+            <a:r>
+              <a:rPr lang="en-US" dirty="0" err="1" smtClean="0"/>
+              <a:t>NumPy</a:t>
+            </a:r>
+            <a:r>
+              <a:rPr lang="en-US" dirty="0" smtClean="0"/>
+              <a:t> so it’s fast and efficient</a:t>
+            </a:r>
+          </a:p>
+          <a:p>
+            <a:r>
+              <a:rPr lang="en-US" dirty="0" smtClean="0"/>
+              <a:t>Be patient </a:t>
+            </a:r>
+          </a:p>
+          <a:p>
+            <a:r>
+              <a:rPr lang="en-US" dirty="0" smtClean="0"/>
+              <a:t>When asking questions, use pandas vocabulary</a:t>
+            </a:r>
+          </a:p>
+          <a:p>
+            <a:r>
+              <a:rPr lang="en-US" dirty="0" smtClean="0"/>
+              <a:t>Be patient (again!)</a:t>
+            </a:r>
+          </a:p>
+          <a:p>
+            <a:endParaRPr lang="en-US" dirty="0"/>
+          </a:p>
+        </p:txBody>
+      </p:sp>
+    </p:spTree>
+    <p:extLst>
+      <p:ext uri="{BB962C8B-B14F-4D97-AF65-F5344CB8AC3E}">
+        <p14:creationId xmlns:p14="http://schemas.microsoft.com/office/powerpoint/2010/main" val="1307599620"/>
       </p:ext>
     </p:extLst>
   </p:cSld>

</xml_diff>

<commit_message>
updated oysters before film session
</commit_message>
<xml_diff>
--- a/week_11/11.1 Introducing Pandas.pptx
+++ b/week_11/11.1 Introducing Pandas.pptx
@@ -290,7 +290,7 @@
           <a:p>
             <a:fld id="{30A10C02-35BF-C647-A35C-91B453C8803C}" type="datetimeFigureOut">
               <a:rPr lang="en-US" smtClean="0"/>
-              <a:t>9/20/15</a:t>
+              <a:t>9/27/15</a:t>
             </a:fld>
             <a:endParaRPr lang="en-US"/>
           </a:p>
@@ -460,7 +460,7 @@
           <a:p>
             <a:fld id="{30A10C02-35BF-C647-A35C-91B453C8803C}" type="datetimeFigureOut">
               <a:rPr lang="en-US" smtClean="0"/>
-              <a:t>9/20/15</a:t>
+              <a:t>9/27/15</a:t>
             </a:fld>
             <a:endParaRPr lang="en-US"/>
           </a:p>
@@ -640,7 +640,7 @@
           <a:p>
             <a:fld id="{30A10C02-35BF-C647-A35C-91B453C8803C}" type="datetimeFigureOut">
               <a:rPr lang="en-US" smtClean="0"/>
-              <a:t>9/20/15</a:t>
+              <a:t>9/27/15</a:t>
             </a:fld>
             <a:endParaRPr lang="en-US"/>
           </a:p>
@@ -810,7 +810,7 @@
           <a:p>
             <a:fld id="{30A10C02-35BF-C647-A35C-91B453C8803C}" type="datetimeFigureOut">
               <a:rPr lang="en-US" smtClean="0"/>
-              <a:t>9/20/15</a:t>
+              <a:t>9/27/15</a:t>
             </a:fld>
             <a:endParaRPr lang="en-US"/>
           </a:p>
@@ -1056,7 +1056,7 @@
           <a:p>
             <a:fld id="{30A10C02-35BF-C647-A35C-91B453C8803C}" type="datetimeFigureOut">
               <a:rPr lang="en-US" smtClean="0"/>
-              <a:t>9/20/15</a:t>
+              <a:t>9/27/15</a:t>
             </a:fld>
             <a:endParaRPr lang="en-US"/>
           </a:p>
@@ -1344,7 +1344,7 @@
           <a:p>
             <a:fld id="{30A10C02-35BF-C647-A35C-91B453C8803C}" type="datetimeFigureOut">
               <a:rPr lang="en-US" smtClean="0"/>
-              <a:t>9/20/15</a:t>
+              <a:t>9/27/15</a:t>
             </a:fld>
             <a:endParaRPr lang="en-US"/>
           </a:p>
@@ -1766,7 +1766,7 @@
           <a:p>
             <a:fld id="{30A10C02-35BF-C647-A35C-91B453C8803C}" type="datetimeFigureOut">
               <a:rPr lang="en-US" smtClean="0"/>
-              <a:t>9/20/15</a:t>
+              <a:t>9/27/15</a:t>
             </a:fld>
             <a:endParaRPr lang="en-US"/>
           </a:p>
@@ -1884,7 +1884,7 @@
           <a:p>
             <a:fld id="{30A10C02-35BF-C647-A35C-91B453C8803C}" type="datetimeFigureOut">
               <a:rPr lang="en-US" smtClean="0"/>
-              <a:t>9/20/15</a:t>
+              <a:t>9/27/15</a:t>
             </a:fld>
             <a:endParaRPr lang="en-US"/>
           </a:p>
@@ -1979,7 +1979,7 @@
           <a:p>
             <a:fld id="{30A10C02-35BF-C647-A35C-91B453C8803C}" type="datetimeFigureOut">
               <a:rPr lang="en-US" smtClean="0"/>
-              <a:t>9/20/15</a:t>
+              <a:t>9/27/15</a:t>
             </a:fld>
             <a:endParaRPr lang="en-US"/>
           </a:p>
@@ -2256,7 +2256,7 @@
           <a:p>
             <a:fld id="{30A10C02-35BF-C647-A35C-91B453C8803C}" type="datetimeFigureOut">
               <a:rPr lang="en-US" smtClean="0"/>
-              <a:t>9/20/15</a:t>
+              <a:t>9/27/15</a:t>
             </a:fld>
             <a:endParaRPr lang="en-US"/>
           </a:p>
@@ -2509,7 +2509,7 @@
           <a:p>
             <a:fld id="{30A10C02-35BF-C647-A35C-91B453C8803C}" type="datetimeFigureOut">
               <a:rPr lang="en-US" smtClean="0"/>
-              <a:t>9/20/15</a:t>
+              <a:t>9/27/15</a:t>
             </a:fld>
             <a:endParaRPr lang="en-US"/>
           </a:p>
@@ -2722,7 +2722,7 @@
           <a:p>
             <a:fld id="{30A10C02-35BF-C647-A35C-91B453C8803C}" type="datetimeFigureOut">
               <a:rPr lang="en-US" smtClean="0"/>
-              <a:t>9/20/15</a:t>
+              <a:t>9/27/15</a:t>
             </a:fld>
             <a:endParaRPr lang="en-US"/>
           </a:p>
@@ -3205,14 +3205,48 @@
         <p:spPr/>
         <p:txBody>
           <a:bodyPr>
-            <a:normAutofit lnSpcReduction="10000"/>
+            <a:normAutofit fontScale="62500" lnSpcReduction="20000"/>
           </a:bodyPr>
           <a:lstStyle/>
           <a:p>
             <a:r>
               <a:rPr lang="en-US" dirty="0" smtClean="0"/>
-              <a:t>Your new best friend</a:t>
-            </a:r>
+              <a:t>Your new best </a:t>
+            </a:r>
+            <a:r>
+              <a:rPr lang="en-US" dirty="0" smtClean="0"/>
+              <a:t>friend</a:t>
+            </a:r>
+          </a:p>
+          <a:p>
+            <a:pPr lvl="1"/>
+            <a:r>
+              <a:rPr lang="en-US" dirty="0" smtClean="0"/>
+              <a:t>It takes the power of </a:t>
+            </a:r>
+            <a:r>
+              <a:rPr lang="en-US" dirty="0" err="1" smtClean="0"/>
+              <a:t>numpy</a:t>
+            </a:r>
+            <a:r>
+              <a:rPr lang="en-US" dirty="0" smtClean="0"/>
+              <a:t>, but wraps it up in a user-friendly package</a:t>
+            </a:r>
+          </a:p>
+          <a:p>
+            <a:pPr lvl="1"/>
+            <a:r>
+              <a:rPr lang="en-US" dirty="0" smtClean="0"/>
+              <a:t>A lot of the syntax is inspired by R</a:t>
+            </a:r>
+          </a:p>
+          <a:p>
+            <a:pPr lvl="2"/>
+            <a:r>
+              <a:rPr lang="en-US" dirty="0" smtClean="0"/>
+              <a:t>Emphasizes functional programming, very clean and explicit code.</a:t>
+            </a:r>
+            <a:endParaRPr lang="en-US" dirty="0" smtClean="0"/>
           </a:p>
           <a:p>
             <a:r>
@@ -3231,7 +3265,11 @@
             <a:pPr lvl="2"/>
             <a:r>
               <a:rPr lang="en-US" dirty="0" smtClean="0"/>
-              <a:t>how you access + label the data</a:t>
+              <a:t>how you access + label the </a:t>
+            </a:r>
+            <a:r>
+              <a:rPr lang="en-US" dirty="0" smtClean="0"/>
+              <a:t>data</a:t>
             </a:r>
           </a:p>
           <a:p>
@@ -3240,6 +3278,7 @@
               <a:rPr lang="en-US" dirty="0" smtClean="0"/>
               <a:t>Series</a:t>
             </a:r>
+            <a:endParaRPr lang="en-US" dirty="0" smtClean="0"/>
           </a:p>
           <a:p>
             <a:pPr lvl="2"/>
@@ -3252,8 +3291,20 @@
             <a:pPr lvl="2"/>
             <a:r>
               <a:rPr lang="en-US" dirty="0" smtClean="0"/>
-              <a:t>Has an Index</a:t>
-            </a:r>
+              <a:t>Has an </a:t>
+            </a:r>
+            <a:r>
+              <a:rPr lang="en-US" dirty="0" smtClean="0"/>
+              <a:t>Index</a:t>
+            </a:r>
+          </a:p>
+          <a:p>
+            <a:pPr lvl="2"/>
+            <a:r>
+              <a:rPr lang="en-US" dirty="0" smtClean="0"/>
+              <a:t>This represents a variable, perhaps measurements</a:t>
+            </a:r>
+            <a:endParaRPr lang="en-US" dirty="0" smtClean="0"/>
           </a:p>
           <a:p>
             <a:pPr lvl="1"/>
@@ -3274,7 +3325,32 @@
             <a:pPr lvl="2"/>
             <a:r>
               <a:rPr lang="en-US" dirty="0" smtClean="0"/>
-              <a:t>Has an Index</a:t>
+              <a:t>Has an </a:t>
+            </a:r>
+            <a:r>
+              <a:rPr lang="en-US" dirty="0" smtClean="0"/>
+              <a:t>Index</a:t>
+            </a:r>
+          </a:p>
+          <a:p>
+            <a:pPr lvl="2"/>
+            <a:r>
+              <a:rPr lang="en-US" dirty="0" smtClean="0"/>
+              <a:t>This is the usual way we represent a dataset.</a:t>
+            </a:r>
+          </a:p>
+          <a:p>
+            <a:pPr lvl="3"/>
+            <a:r>
+              <a:rPr lang="en-US" dirty="0" smtClean="0"/>
+              <a:t>Each column becomes a variable</a:t>
+            </a:r>
+          </a:p>
+          <a:p>
+            <a:pPr lvl="3"/>
+            <a:r>
+              <a:rPr lang="en-US" dirty="0" smtClean="0"/>
+              <a:t>Each row is an observation or a unit of analysis.</a:t>
             </a:r>
             <a:endParaRPr lang="en-US" dirty="0" smtClean="0"/>
           </a:p>
@@ -3364,8 +3440,13 @@
           <a:p>
             <a:r>
               <a:rPr lang="en-US" dirty="0" smtClean="0"/>
-              <a:t>Be patient </a:t>
-            </a:r>
+              <a:t>Be </a:t>
+            </a:r>
+            <a:r>
+              <a:rPr lang="en-US" dirty="0" smtClean="0"/>
+              <a:t>patient</a:t>
+            </a:r>
+            <a:endParaRPr lang="en-US" dirty="0" smtClean="0"/>
           </a:p>
           <a:p>
             <a:r>

</xml_diff>